<commit_message>
correction to one PowerPoint slide
</commit_message>
<xml_diff>
--- a/PowerPoints/07 - Error Handling.pptx
+++ b/PowerPoints/07 - Error Handling.pptx
@@ -38,7 +38,7 @@
     <p:sldId id="291" r:id="rId26"/>
   </p:sldIdLst>
   <p:sldSz cx="9144000" cy="6858000" type="screen4x3"/>
-  <p:notesSz cx="7010400" cy="9296400"/>
+  <p:notesSz cx="7315200" cy="9601200"/>
   <p:defaultTextStyle>
     <a:defPPr>
       <a:defRPr lang="en-US"/>
@@ -181,12 +181,12 @@
     </p:ext>
     <p:ext uri="{2D200454-40CA-4A62-9FC3-DE9A4176ACB9}">
       <p15:notesGuideLst xmlns:p15="http://schemas.microsoft.com/office/powerpoint/2012/main">
-        <p15:guide id="1" orient="horz" pos="2928">
+        <p15:guide id="1" orient="horz" pos="3024" userDrawn="1">
           <p15:clr>
             <a:srgbClr val="A4A3A4"/>
           </p15:clr>
         </p15:guide>
-        <p15:guide id="2" pos="2208">
+        <p15:guide id="2" pos="2304" userDrawn="1">
           <p15:clr>
             <a:srgbClr val="A4A3A4"/>
           </p15:clr>
@@ -234,8 +234,8 @@
         </p:nvSpPr>
         <p:spPr bwMode="auto">
           <a:xfrm>
-            <a:off x="3971925" y="0"/>
-            <a:ext cx="3038475" cy="465138"/>
+            <a:off x="4144618" y="0"/>
+            <a:ext cx="3170583" cy="480388"/>
           </a:xfrm>
           <a:prstGeom prst="rect">
             <a:avLst/>
@@ -250,13 +250,13 @@
           <a:effectLst/>
         </p:spPr>
         <p:txBody>
-          <a:bodyPr vert="horz" wrap="square" lIns="93177" tIns="46589" rIns="93177" bIns="46589" numCol="1" anchor="t" anchorCtr="0" compatLnSpc="1">
+          <a:bodyPr vert="horz" wrap="square" lIns="96653" tIns="48327" rIns="96653" bIns="48327" numCol="1" anchor="t" anchorCtr="0" compatLnSpc="1">
             <a:prstTxWarp prst="textNoShape">
               <a:avLst/>
             </a:prstTxWarp>
           </a:bodyPr>
           <a:lstStyle>
-            <a:lvl1pPr algn="r" defTabSz="931863">
+            <a:lvl1pPr algn="r" defTabSz="966621">
               <a:defRPr sz="1200"/>
             </a:lvl1pPr>
           </a:lstStyle>
@@ -285,8 +285,8 @@
         </p:nvSpPr>
         <p:spPr bwMode="auto">
           <a:xfrm>
-            <a:off x="3971925" y="8831263"/>
-            <a:ext cx="3038475" cy="465137"/>
+            <a:off x="4144618" y="9120813"/>
+            <a:ext cx="3170583" cy="480387"/>
           </a:xfrm>
           <a:prstGeom prst="rect">
             <a:avLst/>
@@ -301,13 +301,13 @@
           <a:effectLst/>
         </p:spPr>
         <p:txBody>
-          <a:bodyPr vert="horz" wrap="square" lIns="93177" tIns="46589" rIns="93177" bIns="46589" numCol="1" anchor="b" anchorCtr="0" compatLnSpc="1">
+          <a:bodyPr vert="horz" wrap="square" lIns="96653" tIns="48327" rIns="96653" bIns="48327" numCol="1" anchor="b" anchorCtr="0" compatLnSpc="1">
             <a:prstTxWarp prst="textNoShape">
               <a:avLst/>
             </a:prstTxWarp>
           </a:bodyPr>
           <a:lstStyle>
-            <a:lvl1pPr algn="r" defTabSz="931863">
+            <a:lvl1pPr algn="r" defTabSz="966621">
               <a:defRPr sz="1200"/>
             </a:lvl1pPr>
           </a:lstStyle>
@@ -385,7 +385,7 @@
         <p:spPr bwMode="auto">
           <a:xfrm>
             <a:off x="0" y="0"/>
-            <a:ext cx="3038475" cy="465138"/>
+            <a:ext cx="3170583" cy="480388"/>
           </a:xfrm>
           <a:prstGeom prst="rect">
             <a:avLst/>
@@ -400,13 +400,13 @@
           <a:effectLst/>
         </p:spPr>
         <p:txBody>
-          <a:bodyPr vert="horz" wrap="square" lIns="93177" tIns="46589" rIns="93177" bIns="46589" numCol="1" anchor="t" anchorCtr="0" compatLnSpc="1">
+          <a:bodyPr vert="horz" wrap="square" lIns="96653" tIns="48327" rIns="96653" bIns="48327" numCol="1" anchor="t" anchorCtr="0" compatLnSpc="1">
             <a:prstTxWarp prst="textNoShape">
               <a:avLst/>
             </a:prstTxWarp>
           </a:bodyPr>
           <a:lstStyle>
-            <a:lvl1pPr algn="l" defTabSz="931863">
+            <a:lvl1pPr algn="l" defTabSz="966621">
               <a:defRPr sz="1200"/>
             </a:lvl1pPr>
           </a:lstStyle>
@@ -433,8 +433,8 @@
         </p:nvSpPr>
         <p:spPr bwMode="auto">
           <a:xfrm>
-            <a:off x="3971925" y="0"/>
-            <a:ext cx="3038475" cy="465138"/>
+            <a:off x="4144618" y="0"/>
+            <a:ext cx="3170583" cy="480388"/>
           </a:xfrm>
           <a:prstGeom prst="rect">
             <a:avLst/>
@@ -449,13 +449,13 @@
           <a:effectLst/>
         </p:spPr>
         <p:txBody>
-          <a:bodyPr vert="horz" wrap="square" lIns="93177" tIns="46589" rIns="93177" bIns="46589" numCol="1" anchor="t" anchorCtr="0" compatLnSpc="1">
+          <a:bodyPr vert="horz" wrap="square" lIns="96653" tIns="48327" rIns="96653" bIns="48327" numCol="1" anchor="t" anchorCtr="0" compatLnSpc="1">
             <a:prstTxWarp prst="textNoShape">
               <a:avLst/>
             </a:prstTxWarp>
           </a:bodyPr>
           <a:lstStyle>
-            <a:lvl1pPr algn="r" defTabSz="931863">
+            <a:lvl1pPr algn="r" defTabSz="966621">
               <a:defRPr sz="1200"/>
             </a:lvl1pPr>
           </a:lstStyle>
@@ -479,8 +479,8 @@
         </p:nvSpPr>
         <p:spPr bwMode="auto">
           <a:xfrm>
-            <a:off x="1181100" y="696913"/>
-            <a:ext cx="4648200" cy="3486150"/>
+            <a:off x="1257300" y="719138"/>
+            <a:ext cx="4800600" cy="3600450"/>
           </a:xfrm>
           <a:prstGeom prst="rect">
             <a:avLst/>
@@ -508,8 +508,8 @@
         </p:nvSpPr>
         <p:spPr bwMode="auto">
           <a:xfrm>
-            <a:off x="935038" y="4416425"/>
-            <a:ext cx="5140325" cy="4183063"/>
+            <a:off x="975693" y="4561226"/>
+            <a:ext cx="5363817" cy="4320213"/>
           </a:xfrm>
           <a:prstGeom prst="rect">
             <a:avLst/>
@@ -524,7 +524,7 @@
           <a:effectLst/>
         </p:spPr>
         <p:txBody>
-          <a:bodyPr vert="horz" wrap="square" lIns="93177" tIns="46589" rIns="93177" bIns="46589" numCol="1" anchor="t" anchorCtr="0" compatLnSpc="1">
+          <a:bodyPr vert="horz" wrap="square" lIns="96653" tIns="48327" rIns="96653" bIns="48327" numCol="1" anchor="t" anchorCtr="0" compatLnSpc="1">
             <a:prstTxWarp prst="textNoShape">
               <a:avLst/>
             </a:prstTxWarp>
@@ -579,8 +579,8 @@
         </p:nvSpPr>
         <p:spPr bwMode="auto">
           <a:xfrm>
-            <a:off x="0" y="8831263"/>
-            <a:ext cx="3038475" cy="465137"/>
+            <a:off x="0" y="9120813"/>
+            <a:ext cx="3170583" cy="480387"/>
           </a:xfrm>
           <a:prstGeom prst="rect">
             <a:avLst/>
@@ -595,13 +595,13 @@
           <a:effectLst/>
         </p:spPr>
         <p:txBody>
-          <a:bodyPr vert="horz" wrap="square" lIns="93177" tIns="46589" rIns="93177" bIns="46589" numCol="1" anchor="b" anchorCtr="0" compatLnSpc="1">
+          <a:bodyPr vert="horz" wrap="square" lIns="96653" tIns="48327" rIns="96653" bIns="48327" numCol="1" anchor="b" anchorCtr="0" compatLnSpc="1">
             <a:prstTxWarp prst="textNoShape">
               <a:avLst/>
             </a:prstTxWarp>
           </a:bodyPr>
           <a:lstStyle>
-            <a:lvl1pPr algn="l" defTabSz="931863">
+            <a:lvl1pPr algn="l" defTabSz="966621">
               <a:defRPr sz="1200"/>
             </a:lvl1pPr>
           </a:lstStyle>
@@ -625,8 +625,8 @@
         </p:nvSpPr>
         <p:spPr bwMode="auto">
           <a:xfrm>
-            <a:off x="3971925" y="8831263"/>
-            <a:ext cx="3038475" cy="465137"/>
+            <a:off x="4144618" y="9120813"/>
+            <a:ext cx="3170583" cy="480387"/>
           </a:xfrm>
           <a:prstGeom prst="rect">
             <a:avLst/>
@@ -641,13 +641,13 @@
           <a:effectLst/>
         </p:spPr>
         <p:txBody>
-          <a:bodyPr vert="horz" wrap="square" lIns="93177" tIns="46589" rIns="93177" bIns="46589" numCol="1" anchor="b" anchorCtr="0" compatLnSpc="1">
+          <a:bodyPr vert="horz" wrap="square" lIns="96653" tIns="48327" rIns="96653" bIns="48327" numCol="1" anchor="b" anchorCtr="0" compatLnSpc="1">
             <a:prstTxWarp prst="textNoShape">
               <a:avLst/>
             </a:prstTxWarp>
           </a:bodyPr>
           <a:lstStyle>
-            <a:lvl1pPr algn="r" defTabSz="931863">
+            <a:lvl1pPr algn="r" defTabSz="966621">
               <a:defRPr sz="1200"/>
             </a:lvl1pPr>
           </a:lstStyle>
@@ -5206,8 +5206,8 @@
         </p:nvSpPr>
         <p:spPr>
           <a:xfrm>
-            <a:off x="289560" y="1363663"/>
-            <a:ext cx="8778240" cy="4935537"/>
+            <a:off x="228600" y="1363663"/>
+            <a:ext cx="8869680" cy="4935537"/>
           </a:xfrm>
         </p:spPr>
         <p:txBody>
@@ -5573,7 +5573,7 @@
               <a:rPr lang="en-US" sz="1800" b="1" dirty="0">
                 <a:latin typeface="Consolas" pitchFamily="49" charset="0"/>
               </a:rPr>
-              <a:t> Symbol.EOF));</a:t>
+              <a:t>, Symbol.EOF));</a:t>
             </a:r>
           </a:p>
           <a:p>

</xml_diff>